<commit_message>
Finish the final project
</commit_message>
<xml_diff>
--- a/Final/BevsBakeryFinal.pptx
+++ b/Final/BevsBakeryFinal.pptx
@@ -8,6 +8,11 @@
     <p:sldId id="256" r:id="rId2"/>
     <p:sldId id="257" r:id="rId3"/>
     <p:sldId id="258" r:id="rId4"/>
+    <p:sldId id="259" r:id="rId5"/>
+    <p:sldId id="260" r:id="rId6"/>
+    <p:sldId id="261" r:id="rId7"/>
+    <p:sldId id="262" r:id="rId8"/>
+    <p:sldId id="263" r:id="rId9"/>
   </p:sldIdLst>
   <p:sldSz cx="12192000" cy="6858000"/>
   <p:notesSz cx="6858000" cy="9144000"/>
@@ -106,6 +111,11 @@
       </a:defRPr>
     </a:lvl9pPr>
   </p:defaultTextStyle>
+  <p:extLst>
+    <p:ext uri="{EFAFB233-063F-42B5-8137-9DF3F51BA10A}">
+      <p15:sldGuideLst xmlns:p15="http://schemas.microsoft.com/office/powerpoint/2012/main"/>
+    </p:ext>
+  </p:extLst>
 </p:presentation>
 </file>
 
@@ -612,7 +622,7 @@
             <a:fld id="{B61BEF0D-F0BB-DE4B-95CE-6DB70DBA9567}" type="datetimeFigureOut">
               <a:rPr lang="en-US" dirty="0"/>
               <a:pPr/>
-              <a:t>4/28/2020</a:t>
+              <a:t>5/2/2020</a:t>
             </a:fld>
             <a:endParaRPr lang="en-US" dirty="0"/>
           </a:p>
@@ -905,7 +915,7 @@
             <a:fld id="{B61BEF0D-F0BB-DE4B-95CE-6DB70DBA9567}" type="datetimeFigureOut">
               <a:rPr lang="en-US" dirty="0"/>
               <a:pPr/>
-              <a:t>4/28/2020</a:t>
+              <a:t>5/2/2020</a:t>
             </a:fld>
             <a:endParaRPr lang="en-US" dirty="0"/>
           </a:p>
@@ -1150,7 +1160,7 @@
             <a:fld id="{B61BEF0D-F0BB-DE4B-95CE-6DB70DBA9567}" type="datetimeFigureOut">
               <a:rPr lang="en-US" dirty="0"/>
               <a:pPr/>
-              <a:t>4/28/2020</a:t>
+              <a:t>5/2/2020</a:t>
             </a:fld>
             <a:endParaRPr lang="en-US" dirty="0"/>
           </a:p>
@@ -1687,7 +1697,7 @@
             <a:fld id="{B61BEF0D-F0BB-DE4B-95CE-6DB70DBA9567}" type="datetimeFigureOut">
               <a:rPr lang="en-US" dirty="0"/>
               <a:pPr/>
-              <a:t>4/28/2020</a:t>
+              <a:t>5/2/2020</a:t>
             </a:fld>
             <a:endParaRPr lang="en-US" dirty="0"/>
           </a:p>
@@ -1932,7 +1942,7 @@
             <a:fld id="{B61BEF0D-F0BB-DE4B-95CE-6DB70DBA9567}" type="datetimeFigureOut">
               <a:rPr lang="en-US" dirty="0"/>
               <a:pPr/>
-              <a:t>4/28/2020</a:t>
+              <a:t>5/2/2020</a:t>
             </a:fld>
             <a:endParaRPr lang="en-US" dirty="0"/>
           </a:p>
@@ -2461,7 +2471,7 @@
             <a:fld id="{B61BEF0D-F0BB-DE4B-95CE-6DB70DBA9567}" type="datetimeFigureOut">
               <a:rPr lang="en-US" dirty="0"/>
               <a:pPr/>
-              <a:t>4/28/2020</a:t>
+              <a:t>5/2/2020</a:t>
             </a:fld>
             <a:endParaRPr lang="en-US" dirty="0"/>
           </a:p>
@@ -2755,7 +2765,7 @@
             <a:fld id="{B61BEF0D-F0BB-DE4B-95CE-6DB70DBA9567}" type="datetimeFigureOut">
               <a:rPr lang="en-US" dirty="0"/>
               <a:pPr/>
-              <a:t>4/28/2020</a:t>
+              <a:t>5/2/2020</a:t>
             </a:fld>
             <a:endParaRPr lang="en-US" dirty="0"/>
           </a:p>
@@ -2926,7 +2936,7 @@
             <a:fld id="{B61BEF0D-F0BB-DE4B-95CE-6DB70DBA9567}" type="datetimeFigureOut">
               <a:rPr lang="en-US" dirty="0"/>
               <a:pPr/>
-              <a:t>4/28/2020</a:t>
+              <a:t>5/2/2020</a:t>
             </a:fld>
             <a:endParaRPr lang="en-US" dirty="0"/>
           </a:p>
@@ -3103,7 +3113,7 @@
             <a:fld id="{B61BEF0D-F0BB-DE4B-95CE-6DB70DBA9567}" type="datetimeFigureOut">
               <a:rPr lang="en-US" dirty="0"/>
               <a:pPr/>
-              <a:t>4/28/2020</a:t>
+              <a:t>5/2/2020</a:t>
             </a:fld>
             <a:endParaRPr lang="en-US" dirty="0"/>
           </a:p>
@@ -3270,7 +3280,7 @@
             <a:fld id="{B61BEF0D-F0BB-DE4B-95CE-6DB70DBA9567}" type="datetimeFigureOut">
               <a:rPr lang="en-US" dirty="0"/>
               <a:pPr/>
-              <a:t>4/28/2020</a:t>
+              <a:t>5/2/2020</a:t>
             </a:fld>
             <a:endParaRPr lang="en-US" dirty="0"/>
           </a:p>
@@ -3518,7 +3528,7 @@
             <a:fld id="{B61BEF0D-F0BB-DE4B-95CE-6DB70DBA9567}" type="datetimeFigureOut">
               <a:rPr lang="en-US" dirty="0"/>
               <a:pPr/>
-              <a:t>4/28/2020</a:t>
+              <a:t>5/2/2020</a:t>
             </a:fld>
             <a:endParaRPr lang="en-US" dirty="0"/>
           </a:p>
@@ -3812,7 +3822,7 @@
             <a:fld id="{B61BEF0D-F0BB-DE4B-95CE-6DB70DBA9567}" type="datetimeFigureOut">
               <a:rPr lang="en-US" dirty="0"/>
               <a:pPr/>
-              <a:t>4/28/2020</a:t>
+              <a:t>5/2/2020</a:t>
             </a:fld>
             <a:endParaRPr lang="en-US" dirty="0"/>
           </a:p>
@@ -4251,7 +4261,7 @@
             <a:fld id="{B61BEF0D-F0BB-DE4B-95CE-6DB70DBA9567}" type="datetimeFigureOut">
               <a:rPr lang="en-US" dirty="0"/>
               <a:pPr/>
-              <a:t>4/28/2020</a:t>
+              <a:t>5/2/2020</a:t>
             </a:fld>
             <a:endParaRPr lang="en-US" dirty="0"/>
           </a:p>
@@ -4366,7 +4376,7 @@
             <a:fld id="{B61BEF0D-F0BB-DE4B-95CE-6DB70DBA9567}" type="datetimeFigureOut">
               <a:rPr lang="en-US" dirty="0"/>
               <a:pPr/>
-              <a:t>4/28/2020</a:t>
+              <a:t>5/2/2020</a:t>
             </a:fld>
             <a:endParaRPr lang="en-US" dirty="0"/>
           </a:p>
@@ -4458,7 +4468,7 @@
             <a:fld id="{B61BEF0D-F0BB-DE4B-95CE-6DB70DBA9567}" type="datetimeFigureOut">
               <a:rPr lang="en-US" dirty="0"/>
               <a:pPr/>
-              <a:t>4/28/2020</a:t>
+              <a:t>5/2/2020</a:t>
             </a:fld>
             <a:endParaRPr lang="en-US" dirty="0"/>
           </a:p>
@@ -4738,7 +4748,7 @@
             <a:fld id="{B61BEF0D-F0BB-DE4B-95CE-6DB70DBA9567}" type="datetimeFigureOut">
               <a:rPr lang="en-US" dirty="0"/>
               <a:pPr/>
-              <a:t>4/28/2020</a:t>
+              <a:t>5/2/2020</a:t>
             </a:fld>
             <a:endParaRPr lang="en-US" dirty="0"/>
           </a:p>
@@ -5026,7 +5036,7 @@
             <a:fld id="{B61BEF0D-F0BB-DE4B-95CE-6DB70DBA9567}" type="datetimeFigureOut">
               <a:rPr lang="en-US" dirty="0"/>
               <a:pPr/>
-              <a:t>4/28/2020</a:t>
+              <a:t>5/2/2020</a:t>
             </a:fld>
             <a:endParaRPr lang="en-US" dirty="0"/>
           </a:p>
@@ -5553,7 +5563,7 @@
             <a:fld id="{B61BEF0D-F0BB-DE4B-95CE-6DB70DBA9567}" type="datetimeFigureOut">
               <a:rPr lang="en-US" dirty="0"/>
               <a:pPr/>
-              <a:t>4/28/2020</a:t>
+              <a:t>5/2/2020</a:t>
             </a:fld>
             <a:endParaRPr lang="en-US" dirty="0"/>
           </a:p>
@@ -6102,7 +6112,12 @@
           <a:lstStyle/>
           <a:p>
             <a:r>
-              <a:rPr lang="en-US" dirty="0"/>
+              <a:rPr lang="en-US" dirty="0">
+                <a:solidFill>
+                  <a:schemeClr val="accent1"/>
+                </a:solidFill>
+                <a:latin typeface="Daytona" panose="020B0604030500040204" pitchFamily="34" charset="0"/>
+              </a:rPr>
               <a:t>Bev’s Bakery Final</a:t>
             </a:r>
           </a:p>
@@ -6238,7 +6253,7 @@
         </p:blipFill>
         <p:spPr>
           <a:xfrm>
-            <a:off x="2188718" y="2732314"/>
+            <a:off x="2188718" y="2601687"/>
             <a:ext cx="7814564" cy="3635829"/>
           </a:xfrm>
           <a:prstGeom prst="rect">
@@ -6298,7 +6313,12 @@
           <a:lstStyle/>
           <a:p>
             <a:r>
-              <a:rPr lang="en-US" dirty="0"/>
+              <a:rPr lang="en-US" dirty="0">
+                <a:solidFill>
+                  <a:schemeClr val="accent1"/>
+                </a:solidFill>
+                <a:latin typeface="Daytona" panose="020B0604030500040204" pitchFamily="34" charset="0"/>
+              </a:rPr>
               <a:t>Google Analytics</a:t>
             </a:r>
           </a:p>
@@ -6329,7 +6349,9 @@
               <a:buNone/>
             </a:pPr>
             <a:r>
-              <a:rPr lang="en-US" dirty="0"/>
+              <a:rPr lang="en-US" dirty="0">
+                <a:latin typeface="Daytona" panose="020B0604030500040204" pitchFamily="34" charset="0"/>
+              </a:rPr>
               <a:t>Google analytics would provide the following benefits to the website:</a:t>
             </a:r>
           </a:p>
@@ -6339,7 +6361,9 @@
               <a:buChar char="•"/>
             </a:pPr>
             <a:r>
-              <a:rPr lang="en-US" dirty="0"/>
+              <a:rPr lang="en-US" dirty="0">
+                <a:latin typeface="Daytona" panose="020B0604030500040204" pitchFamily="34" charset="0"/>
+              </a:rPr>
               <a:t>Track success of ad campaigns</a:t>
             </a:r>
           </a:p>
@@ -6349,7 +6373,9 @@
               <a:buChar char="•"/>
             </a:pPr>
             <a:r>
-              <a:rPr lang="en-US" dirty="0"/>
+              <a:rPr lang="en-US" dirty="0">
+                <a:latin typeface="Daytona" panose="020B0604030500040204" pitchFamily="34" charset="0"/>
+              </a:rPr>
               <a:t>Track visitors and map their movement through the site</a:t>
             </a:r>
           </a:p>
@@ -6359,7 +6385,9 @@
               <a:buChar char="•"/>
             </a:pPr>
             <a:r>
-              <a:rPr lang="en-US" dirty="0"/>
+              <a:rPr lang="en-US" dirty="0">
+                <a:latin typeface="Daytona" panose="020B0604030500040204" pitchFamily="34" charset="0"/>
+              </a:rPr>
               <a:t>Capturing target audiences</a:t>
             </a:r>
           </a:p>
@@ -6369,7 +6397,9 @@
               <a:buChar char="•"/>
             </a:pPr>
             <a:r>
-              <a:rPr lang="en-US" dirty="0"/>
+              <a:rPr lang="en-US" dirty="0">
+                <a:latin typeface="Daytona" panose="020B0604030500040204" pitchFamily="34" charset="0"/>
+              </a:rPr>
               <a:t>Understanding of visitors’ needs as potential customers</a:t>
             </a:r>
           </a:p>
@@ -6379,6 +6409,543 @@
     <p:extLst>
       <p:ext uri="{BB962C8B-B14F-4D97-AF65-F5344CB8AC3E}">
         <p14:creationId xmlns:p14="http://schemas.microsoft.com/office/powerpoint/2010/main" val="3072095616"/>
+      </p:ext>
+    </p:extLst>
+  </p:cSld>
+  <p:clrMapOvr>
+    <a:masterClrMapping/>
+  </p:clrMapOvr>
+</p:sld>
+</file>
+
+<file path=ppt/slides/slide4.xml><?xml version="1.0" encoding="utf-8"?>
+<p:sld xmlns:a="http://schemas.openxmlformats.org/drawingml/2006/main" xmlns:r="http://schemas.openxmlformats.org/officeDocument/2006/relationships" xmlns:p="http://schemas.openxmlformats.org/presentationml/2006/main">
+  <p:cSld>
+    <p:spTree>
+      <p:nvGrpSpPr>
+        <p:cNvPr id="1" name=""/>
+        <p:cNvGrpSpPr/>
+        <p:nvPr/>
+      </p:nvGrpSpPr>
+      <p:grpSpPr>
+        <a:xfrm>
+          <a:off x="0" y="0"/>
+          <a:ext cx="0" cy="0"/>
+          <a:chOff x="0" y="0"/>
+          <a:chExt cx="0" cy="0"/>
+        </a:xfrm>
+      </p:grpSpPr>
+      <p:sp>
+        <p:nvSpPr>
+          <p:cNvPr id="2" name="Title 1">
+            <a:extLst>
+              <a:ext uri="{FF2B5EF4-FFF2-40B4-BE49-F238E27FC236}">
+                <a16:creationId xmlns:a16="http://schemas.microsoft.com/office/drawing/2014/main" id="{C9B3AF3E-D00B-462E-8124-0CBE153DF499}"/>
+              </a:ext>
+            </a:extLst>
+          </p:cNvPr>
+          <p:cNvSpPr>
+            <a:spLocks noGrp="1"/>
+          </p:cNvSpPr>
+          <p:nvPr>
+            <p:ph type="title"/>
+          </p:nvPr>
+        </p:nvSpPr>
+        <p:spPr>
+          <a:xfrm>
+            <a:off x="1086643" y="2552700"/>
+            <a:ext cx="10018713" cy="1752599"/>
+          </a:xfrm>
+        </p:spPr>
+        <p:txBody>
+          <a:bodyPr/>
+          <a:lstStyle/>
+          <a:p>
+            <a:r>
+              <a:rPr lang="en-US" dirty="0">
+                <a:solidFill>
+                  <a:schemeClr val="accent1"/>
+                </a:solidFill>
+                <a:latin typeface="Daytona" panose="020B0604030500040204" pitchFamily="34" charset="0"/>
+              </a:rPr>
+              <a:t>Digital Marketing</a:t>
+            </a:r>
+          </a:p>
+        </p:txBody>
+      </p:sp>
+    </p:spTree>
+    <p:extLst>
+      <p:ext uri="{BB962C8B-B14F-4D97-AF65-F5344CB8AC3E}">
+        <p14:creationId xmlns:p14="http://schemas.microsoft.com/office/powerpoint/2010/main" val="1772734739"/>
+      </p:ext>
+    </p:extLst>
+  </p:cSld>
+  <p:clrMapOvr>
+    <a:masterClrMapping/>
+  </p:clrMapOvr>
+</p:sld>
+</file>
+
+<file path=ppt/slides/slide5.xml><?xml version="1.0" encoding="utf-8"?>
+<p:sld xmlns:a="http://schemas.openxmlformats.org/drawingml/2006/main" xmlns:r="http://schemas.openxmlformats.org/officeDocument/2006/relationships" xmlns:p="http://schemas.openxmlformats.org/presentationml/2006/main">
+  <p:cSld>
+    <p:spTree>
+      <p:nvGrpSpPr>
+        <p:cNvPr id="1" name=""/>
+        <p:cNvGrpSpPr/>
+        <p:nvPr/>
+      </p:nvGrpSpPr>
+      <p:grpSpPr>
+        <a:xfrm>
+          <a:off x="0" y="0"/>
+          <a:ext cx="0" cy="0"/>
+          <a:chOff x="0" y="0"/>
+          <a:chExt cx="0" cy="0"/>
+        </a:xfrm>
+      </p:grpSpPr>
+      <p:sp>
+        <p:nvSpPr>
+          <p:cNvPr id="2" name="Title 1">
+            <a:extLst>
+              <a:ext uri="{FF2B5EF4-FFF2-40B4-BE49-F238E27FC236}">
+                <a16:creationId xmlns:a16="http://schemas.microsoft.com/office/drawing/2014/main" id="{431DEE26-E8A6-4602-A854-5B3B5C3C7FCD}"/>
+              </a:ext>
+            </a:extLst>
+          </p:cNvPr>
+          <p:cNvSpPr>
+            <a:spLocks noGrp="1"/>
+          </p:cNvSpPr>
+          <p:nvPr>
+            <p:ph type="title"/>
+          </p:nvPr>
+        </p:nvSpPr>
+        <p:spPr/>
+        <p:txBody>
+          <a:bodyPr/>
+          <a:lstStyle/>
+          <a:p>
+            <a:r>
+              <a:rPr lang="en-US" dirty="0">
+                <a:solidFill>
+                  <a:schemeClr val="accent1"/>
+                </a:solidFill>
+                <a:latin typeface="Daytona" panose="020B0604030500040204" pitchFamily="34" charset="0"/>
+              </a:rPr>
+              <a:t>Facebook Marketing</a:t>
+            </a:r>
+          </a:p>
+        </p:txBody>
+      </p:sp>
+      <p:sp>
+        <p:nvSpPr>
+          <p:cNvPr id="3" name="Content Placeholder 2">
+            <a:extLst>
+              <a:ext uri="{FF2B5EF4-FFF2-40B4-BE49-F238E27FC236}">
+                <a16:creationId xmlns:a16="http://schemas.microsoft.com/office/drawing/2014/main" id="{F9EA012C-27BC-4C8B-A1C6-922422FB31DE}"/>
+              </a:ext>
+            </a:extLst>
+          </p:cNvPr>
+          <p:cNvSpPr>
+            <a:spLocks noGrp="1"/>
+          </p:cNvSpPr>
+          <p:nvPr>
+            <p:ph idx="1"/>
+          </p:nvPr>
+        </p:nvSpPr>
+        <p:spPr/>
+        <p:txBody>
+          <a:bodyPr>
+            <a:normAutofit/>
+          </a:bodyPr>
+          <a:lstStyle/>
+          <a:p>
+            <a:r>
+              <a:rPr lang="en-US" sz="2200" dirty="0">
+                <a:latin typeface="Daytona" panose="020B0604030500040204" pitchFamily="34" charset="0"/>
+              </a:rPr>
+              <a:t>Run single image ad for a month</a:t>
+            </a:r>
+          </a:p>
+          <a:p>
+            <a:r>
+              <a:rPr lang="en-US" sz="2200" dirty="0">
+                <a:latin typeface="Daytona" panose="020B0604030500040204" pitchFamily="34" charset="0"/>
+              </a:rPr>
+              <a:t>Set a daily budget of $4</a:t>
+            </a:r>
+          </a:p>
+          <a:p>
+            <a:r>
+              <a:rPr lang="en-US" sz="2200" dirty="0">
+                <a:latin typeface="Daytona" panose="020B0604030500040204" pitchFamily="34" charset="0"/>
+              </a:rPr>
+              <a:t>Maximum monthly budget of $121</a:t>
+            </a:r>
+          </a:p>
+        </p:txBody>
+      </p:sp>
+    </p:spTree>
+    <p:extLst>
+      <p:ext uri="{BB962C8B-B14F-4D97-AF65-F5344CB8AC3E}">
+        <p14:creationId xmlns:p14="http://schemas.microsoft.com/office/powerpoint/2010/main" val="3397861244"/>
+      </p:ext>
+    </p:extLst>
+  </p:cSld>
+  <p:clrMapOvr>
+    <a:masterClrMapping/>
+  </p:clrMapOvr>
+</p:sld>
+</file>
+
+<file path=ppt/slides/slide6.xml><?xml version="1.0" encoding="utf-8"?>
+<p:sld xmlns:a="http://schemas.openxmlformats.org/drawingml/2006/main" xmlns:r="http://schemas.openxmlformats.org/officeDocument/2006/relationships" xmlns:p="http://schemas.openxmlformats.org/presentationml/2006/main">
+  <p:cSld>
+    <p:spTree>
+      <p:nvGrpSpPr>
+        <p:cNvPr id="1" name=""/>
+        <p:cNvGrpSpPr/>
+        <p:nvPr/>
+      </p:nvGrpSpPr>
+      <p:grpSpPr>
+        <a:xfrm>
+          <a:off x="0" y="0"/>
+          <a:ext cx="0" cy="0"/>
+          <a:chOff x="0" y="0"/>
+          <a:chExt cx="0" cy="0"/>
+        </a:xfrm>
+      </p:grpSpPr>
+      <p:sp>
+        <p:nvSpPr>
+          <p:cNvPr id="2" name="Title 1">
+            <a:extLst>
+              <a:ext uri="{FF2B5EF4-FFF2-40B4-BE49-F238E27FC236}">
+                <a16:creationId xmlns:a16="http://schemas.microsoft.com/office/drawing/2014/main" id="{431DEE26-E8A6-4602-A854-5B3B5C3C7FCD}"/>
+              </a:ext>
+            </a:extLst>
+          </p:cNvPr>
+          <p:cNvSpPr>
+            <a:spLocks noGrp="1"/>
+          </p:cNvSpPr>
+          <p:nvPr>
+            <p:ph type="title"/>
+          </p:nvPr>
+        </p:nvSpPr>
+        <p:spPr/>
+        <p:txBody>
+          <a:bodyPr/>
+          <a:lstStyle/>
+          <a:p>
+            <a:r>
+              <a:rPr lang="en-US" dirty="0">
+                <a:solidFill>
+                  <a:schemeClr val="accent1"/>
+                </a:solidFill>
+                <a:latin typeface="Daytona" panose="020B0604030500040204" pitchFamily="34" charset="0"/>
+              </a:rPr>
+              <a:t>Instagram Marketing</a:t>
+            </a:r>
+          </a:p>
+        </p:txBody>
+      </p:sp>
+      <p:sp>
+        <p:nvSpPr>
+          <p:cNvPr id="3" name="Content Placeholder 2">
+            <a:extLst>
+              <a:ext uri="{FF2B5EF4-FFF2-40B4-BE49-F238E27FC236}">
+                <a16:creationId xmlns:a16="http://schemas.microsoft.com/office/drawing/2014/main" id="{F9EA012C-27BC-4C8B-A1C6-922422FB31DE}"/>
+              </a:ext>
+            </a:extLst>
+          </p:cNvPr>
+          <p:cNvSpPr>
+            <a:spLocks noGrp="1"/>
+          </p:cNvSpPr>
+          <p:nvPr>
+            <p:ph idx="1"/>
+          </p:nvPr>
+        </p:nvSpPr>
+        <p:spPr/>
+        <p:txBody>
+          <a:bodyPr>
+            <a:normAutofit/>
+          </a:bodyPr>
+          <a:lstStyle/>
+          <a:p>
+            <a:r>
+              <a:rPr lang="en-US" sz="2200" dirty="0">
+                <a:latin typeface="Daytona" panose="020B0604030500040204" pitchFamily="34" charset="0"/>
+              </a:rPr>
+              <a:t>Instagram ads the highest engagement rate of all digital ad  platforms</a:t>
+            </a:r>
+          </a:p>
+          <a:p>
+            <a:r>
+              <a:rPr lang="en-US" sz="2200" dirty="0">
+                <a:latin typeface="Daytona" panose="020B0604030500040204" pitchFamily="34" charset="0"/>
+              </a:rPr>
+              <a:t>Run a photo add until maximum budget is met</a:t>
+            </a:r>
+          </a:p>
+          <a:p>
+            <a:r>
+              <a:rPr lang="en-US" sz="2200" dirty="0">
+                <a:latin typeface="Daytona" panose="020B0604030500040204" pitchFamily="34" charset="0"/>
+              </a:rPr>
+              <a:t>Maximum budget of $109 will allow 145 interactions at $.75 per click</a:t>
+            </a:r>
+          </a:p>
+          <a:p>
+            <a:endParaRPr lang="en-US" sz="2200" dirty="0">
+              <a:latin typeface="Daytona" panose="020B0604030500040204" pitchFamily="34" charset="0"/>
+            </a:endParaRPr>
+          </a:p>
+        </p:txBody>
+      </p:sp>
+    </p:spTree>
+    <p:extLst>
+      <p:ext uri="{BB962C8B-B14F-4D97-AF65-F5344CB8AC3E}">
+        <p14:creationId xmlns:p14="http://schemas.microsoft.com/office/powerpoint/2010/main" val="1715681589"/>
+      </p:ext>
+    </p:extLst>
+  </p:cSld>
+  <p:clrMapOvr>
+    <a:masterClrMapping/>
+  </p:clrMapOvr>
+</p:sld>
+</file>
+
+<file path=ppt/slides/slide7.xml><?xml version="1.0" encoding="utf-8"?>
+<p:sld xmlns:a="http://schemas.openxmlformats.org/drawingml/2006/main" xmlns:r="http://schemas.openxmlformats.org/officeDocument/2006/relationships" xmlns:p="http://schemas.openxmlformats.org/presentationml/2006/main">
+  <p:cSld>
+    <p:spTree>
+      <p:nvGrpSpPr>
+        <p:cNvPr id="1" name=""/>
+        <p:cNvGrpSpPr/>
+        <p:nvPr/>
+      </p:nvGrpSpPr>
+      <p:grpSpPr>
+        <a:xfrm>
+          <a:off x="0" y="0"/>
+          <a:ext cx="0" cy="0"/>
+          <a:chOff x="0" y="0"/>
+          <a:chExt cx="0" cy="0"/>
+        </a:xfrm>
+      </p:grpSpPr>
+      <p:sp>
+        <p:nvSpPr>
+          <p:cNvPr id="2" name="Title 1">
+            <a:extLst>
+              <a:ext uri="{FF2B5EF4-FFF2-40B4-BE49-F238E27FC236}">
+                <a16:creationId xmlns:a16="http://schemas.microsoft.com/office/drawing/2014/main" id="{0B859C09-889B-47EB-B1C9-7583E9D56FED}"/>
+              </a:ext>
+            </a:extLst>
+          </p:cNvPr>
+          <p:cNvSpPr>
+            <a:spLocks noGrp="1"/>
+          </p:cNvSpPr>
+          <p:nvPr>
+            <p:ph type="title"/>
+          </p:nvPr>
+        </p:nvSpPr>
+        <p:spPr/>
+        <p:txBody>
+          <a:bodyPr/>
+          <a:lstStyle/>
+          <a:p>
+            <a:r>
+              <a:rPr lang="en-US" dirty="0">
+                <a:solidFill>
+                  <a:schemeClr val="accent1"/>
+                </a:solidFill>
+                <a:latin typeface="Daytona" panose="020B0604030500040204" pitchFamily="34" charset="0"/>
+              </a:rPr>
+              <a:t>Advertisement Examples</a:t>
+            </a:r>
+          </a:p>
+        </p:txBody>
+      </p:sp>
+      <p:pic>
+        <p:nvPicPr>
+          <p:cNvPr id="6" name="Content Placeholder 5" descr="A picture containing table, food&#10;&#10;Description automatically generated">
+            <a:extLst>
+              <a:ext uri="{FF2B5EF4-FFF2-40B4-BE49-F238E27FC236}">
+                <a16:creationId xmlns:a16="http://schemas.microsoft.com/office/drawing/2014/main" id="{BAD24F05-248C-4CBB-A52B-3344688F574B}"/>
+              </a:ext>
+            </a:extLst>
+          </p:cNvPr>
+          <p:cNvPicPr>
+            <a:picLocks noGrp="1" noChangeAspect="1"/>
+          </p:cNvPicPr>
+          <p:nvPr>
+            <p:ph sz="half" idx="1"/>
+          </p:nvPr>
+        </p:nvPicPr>
+        <p:blipFill>
+          <a:blip r:embed="rId2"/>
+          <a:stretch>
+            <a:fillRect/>
+          </a:stretch>
+        </p:blipFill>
+        <p:spPr>
+          <a:xfrm>
+            <a:off x="2369344" y="2667000"/>
+            <a:ext cx="3124200" cy="3124200"/>
+          </a:xfrm>
+        </p:spPr>
+      </p:pic>
+      <p:pic>
+        <p:nvPicPr>
+          <p:cNvPr id="12" name="Content Placeholder 11" descr="A picture containing colorful, many, cake, food&#10;&#10;Description automatically generated">
+            <a:extLst>
+              <a:ext uri="{FF2B5EF4-FFF2-40B4-BE49-F238E27FC236}">
+                <a16:creationId xmlns:a16="http://schemas.microsoft.com/office/drawing/2014/main" id="{6C11D52F-33A8-414D-B2FF-06115ECEC076}"/>
+              </a:ext>
+            </a:extLst>
+          </p:cNvPr>
+          <p:cNvPicPr>
+            <a:picLocks noGrp="1" noChangeAspect="1"/>
+          </p:cNvPicPr>
+          <p:nvPr>
+            <p:ph sz="half" idx="2"/>
+          </p:nvPr>
+        </p:nvPicPr>
+        <p:blipFill>
+          <a:blip r:embed="rId3"/>
+          <a:stretch>
+            <a:fillRect/>
+          </a:stretch>
+        </p:blipFill>
+        <p:spPr>
+          <a:xfrm>
+            <a:off x="7493000" y="2667000"/>
+            <a:ext cx="3124200" cy="3124200"/>
+          </a:xfrm>
+        </p:spPr>
+      </p:pic>
+    </p:spTree>
+    <p:extLst>
+      <p:ext uri="{BB962C8B-B14F-4D97-AF65-F5344CB8AC3E}">
+        <p14:creationId xmlns:p14="http://schemas.microsoft.com/office/powerpoint/2010/main" val="1521393047"/>
+      </p:ext>
+    </p:extLst>
+  </p:cSld>
+  <p:clrMapOvr>
+    <a:masterClrMapping/>
+  </p:clrMapOvr>
+</p:sld>
+</file>
+
+<file path=ppt/slides/slide8.xml><?xml version="1.0" encoding="utf-8"?>
+<p:sld xmlns:a="http://schemas.openxmlformats.org/drawingml/2006/main" xmlns:r="http://schemas.openxmlformats.org/officeDocument/2006/relationships" xmlns:p="http://schemas.openxmlformats.org/presentationml/2006/main">
+  <p:cSld>
+    <p:spTree>
+      <p:nvGrpSpPr>
+        <p:cNvPr id="1" name=""/>
+        <p:cNvGrpSpPr/>
+        <p:nvPr/>
+      </p:nvGrpSpPr>
+      <p:grpSpPr>
+        <a:xfrm>
+          <a:off x="0" y="0"/>
+          <a:ext cx="0" cy="0"/>
+          <a:chOff x="0" y="0"/>
+          <a:chExt cx="0" cy="0"/>
+        </a:xfrm>
+      </p:grpSpPr>
+      <p:sp>
+        <p:nvSpPr>
+          <p:cNvPr id="2" name="Title 1">
+            <a:extLst>
+              <a:ext uri="{FF2B5EF4-FFF2-40B4-BE49-F238E27FC236}">
+                <a16:creationId xmlns:a16="http://schemas.microsoft.com/office/drawing/2014/main" id="{6CECC4D5-1F7C-4A58-8F8D-EF832860F5DF}"/>
+              </a:ext>
+            </a:extLst>
+          </p:cNvPr>
+          <p:cNvSpPr>
+            <a:spLocks noGrp="1"/>
+          </p:cNvSpPr>
+          <p:nvPr>
+            <p:ph type="title"/>
+          </p:nvPr>
+        </p:nvSpPr>
+        <p:spPr/>
+        <p:txBody>
+          <a:bodyPr/>
+          <a:lstStyle/>
+          <a:p>
+            <a:r>
+              <a:rPr lang="en-US" dirty="0">
+                <a:solidFill>
+                  <a:schemeClr val="accent1"/>
+                </a:solidFill>
+                <a:latin typeface="Daytona" panose="020B0604030500040204" pitchFamily="34" charset="0"/>
+              </a:rPr>
+              <a:t>Hootsuite</a:t>
+            </a:r>
+          </a:p>
+        </p:txBody>
+      </p:sp>
+      <p:sp>
+        <p:nvSpPr>
+          <p:cNvPr id="3" name="Content Placeholder 2">
+            <a:extLst>
+              <a:ext uri="{FF2B5EF4-FFF2-40B4-BE49-F238E27FC236}">
+                <a16:creationId xmlns:a16="http://schemas.microsoft.com/office/drawing/2014/main" id="{1ECBC9B0-B6E8-4A11-B2E9-A91D93FFE820}"/>
+              </a:ext>
+            </a:extLst>
+          </p:cNvPr>
+          <p:cNvSpPr>
+            <a:spLocks noGrp="1"/>
+          </p:cNvSpPr>
+          <p:nvPr>
+            <p:ph idx="1"/>
+          </p:nvPr>
+        </p:nvSpPr>
+        <p:spPr/>
+        <p:txBody>
+          <a:bodyPr/>
+          <a:lstStyle/>
+          <a:p>
+            <a:r>
+              <a:rPr lang="en-US" dirty="0"/>
+              <a:t>Effective way to improve presence across multiple social media platforms.</a:t>
+            </a:r>
+          </a:p>
+          <a:p>
+            <a:r>
+              <a:rPr lang="en-US" dirty="0"/>
+              <a:t>Scheduled content releases</a:t>
+            </a:r>
+          </a:p>
+          <a:p>
+            <a:r>
+              <a:rPr lang="en-US" dirty="0"/>
+              <a:t>Engage with users</a:t>
+            </a:r>
+          </a:p>
+          <a:p>
+            <a:r>
+              <a:rPr lang="en-US" dirty="0"/>
+              <a:t>Reports to measure campaign success</a:t>
+            </a:r>
+          </a:p>
+          <a:p>
+            <a:r>
+              <a:rPr lang="en-US" dirty="0"/>
+              <a:t>Plans start at $29/month</a:t>
+            </a:r>
+          </a:p>
+          <a:p>
+            <a:r>
+              <a:rPr lang="en-US" dirty="0"/>
+              <a:t>30 day free trial to check effectiveness</a:t>
+            </a:r>
+          </a:p>
+        </p:txBody>
+      </p:sp>
+    </p:spTree>
+    <p:extLst>
+      <p:ext uri="{BB962C8B-B14F-4D97-AF65-F5344CB8AC3E}">
+        <p14:creationId xmlns:p14="http://schemas.microsoft.com/office/powerpoint/2010/main" val="871777404"/>
       </p:ext>
     </p:extLst>
   </p:cSld>

</xml_diff>